<commit_message>
ADDED ROLES IN PPT
</commit_message>
<xml_diff>
--- a/Loan_Prediction .pptx
+++ b/Loan_Prediction .pptx
@@ -5,7 +5,7 @@
     <p:sldMasterId id="2147483660" r:id="rId1"/>
   </p:sldMasterIdLst>
   <p:notesMasterIdLst>
-    <p:notesMasterId r:id="rId12"/>
+    <p:notesMasterId r:id="rId13"/>
   </p:notesMasterIdLst>
   <p:sldIdLst>
     <p:sldId id="264" r:id="rId2"/>
@@ -18,6 +18,7 @@
     <p:sldId id="261" r:id="rId9"/>
     <p:sldId id="262" r:id="rId10"/>
     <p:sldId id="263" r:id="rId11"/>
+    <p:sldId id="267" r:id="rId12"/>
   </p:sldIdLst>
   <p:sldSz cx="9144000" cy="5143500" type="screen16x9"/>
   <p:notesSz cx="6858000" cy="9144000"/>
@@ -6914,6 +6915,468 @@
     <a:masterClrMapping/>
   </p:clrMapOvr>
   <p:transition spd="med"/>
+  <p:timing>
+    <p:tnLst>
+      <p:par>
+        <p:cTn id="1" dur="indefinite" restart="never" nodeType="tmRoot"/>
+      </p:par>
+    </p:tnLst>
+  </p:timing>
+</p:sld>
+</file>
+
+<file path=ppt/slides/slide11.xml><?xml version="1.0" encoding="utf-8"?>
+<p:sld xmlns:a="http://schemas.openxmlformats.org/drawingml/2006/main" xmlns:r="http://schemas.openxmlformats.org/officeDocument/2006/relationships" xmlns:p="http://schemas.openxmlformats.org/presentationml/2006/main">
+  <p:cSld>
+    <p:bg>
+      <p:bgPr>
+        <a:gradFill flip="none" rotWithShape="1">
+          <a:gsLst>
+            <a:gs pos="0">
+              <a:schemeClr val="accent1">
+                <a:hueOff val="457811"/>
+                <a:satOff val="11000"/>
+                <a:lumOff val="25474"/>
+              </a:schemeClr>
+            </a:gs>
+            <a:gs pos="100000">
+              <a:schemeClr val="accent1">
+                <a:hueOff val="542112"/>
+                <a:satOff val="11000"/>
+                <a:lumOff val="35528"/>
+              </a:schemeClr>
+            </a:gs>
+          </a:gsLst>
+          <a:lin ang="16200000" scaled="0"/>
+        </a:gradFill>
+        <a:effectLst/>
+      </p:bgPr>
+    </p:bg>
+    <p:spTree>
+      <p:nvGrpSpPr>
+        <p:cNvPr id="1" name=""/>
+        <p:cNvGrpSpPr/>
+        <p:nvPr/>
+      </p:nvGrpSpPr>
+      <p:grpSpPr>
+        <a:xfrm>
+          <a:off x="0" y="0"/>
+          <a:ext cx="0" cy="0"/>
+          <a:chOff x="0" y="0"/>
+          <a:chExt cx="0" cy="0"/>
+        </a:xfrm>
+      </p:grpSpPr>
+      <p:sp>
+        <p:nvSpPr>
+          <p:cNvPr id="129" name="Google Shape;95;p20"/>
+          <p:cNvSpPr txBox="1">
+            <a:spLocks noGrp="1"/>
+          </p:cNvSpPr>
+          <p:nvPr>
+            <p:ph type="title"/>
+          </p:nvPr>
+        </p:nvSpPr>
+        <p:spPr>
+          <a:xfrm>
+            <a:off x="-498477" y="606860"/>
+            <a:ext cx="7514035" cy="1314449"/>
+          </a:xfrm>
+          <a:prstGeom prst="rect">
+            <a:avLst/>
+          </a:prstGeom>
+        </p:spPr>
+        <p:txBody>
+          <a:bodyPr>
+            <a:normAutofit/>
+          </a:bodyPr>
+          <a:lstStyle>
+            <a:lvl1pPr>
+              <a:defRPr sz="2500"/>
+            </a:lvl1pPr>
+          </a:lstStyle>
+          <a:p>
+            <a:r>
+              <a:rPr lang="en-US" sz="3600" dirty="0" smtClean="0">
+                <a:solidFill>
+                  <a:srgbClr val="0070C0"/>
+                </a:solidFill>
+                <a:latin typeface="Times New Roman" panose="02020603050405020304" pitchFamily="18" charset="0"/>
+                <a:cs typeface="Times New Roman" panose="02020603050405020304" pitchFamily="18" charset="0"/>
+              </a:rPr>
+              <a:t>PPT Creation Roles</a:t>
+            </a:r>
+            <a:endParaRPr sz="3600" dirty="0">
+              <a:solidFill>
+                <a:srgbClr val="0070C0"/>
+              </a:solidFill>
+              <a:latin typeface="Times New Roman" panose="02020603050405020304" pitchFamily="18" charset="0"/>
+              <a:cs typeface="Times New Roman" panose="02020603050405020304" pitchFamily="18" charset="0"/>
+            </a:endParaRPr>
+          </a:p>
+        </p:txBody>
+      </p:sp>
+      <p:sp>
+        <p:nvSpPr>
+          <p:cNvPr id="130" name="Google Shape;96;p20"/>
+          <p:cNvSpPr txBox="1">
+            <a:spLocks noGrp="1"/>
+          </p:cNvSpPr>
+          <p:nvPr>
+            <p:ph type="body" idx="1"/>
+          </p:nvPr>
+        </p:nvSpPr>
+        <p:spPr>
+          <a:xfrm>
+            <a:off x="1738183" y="2357668"/>
+            <a:ext cx="7514035" cy="2343151"/>
+          </a:xfrm>
+          <a:prstGeom prst="rect">
+            <a:avLst/>
+          </a:prstGeom>
+        </p:spPr>
+        <p:txBody>
+          <a:bodyPr>
+            <a:normAutofit fontScale="92500"/>
+          </a:bodyPr>
+          <a:lstStyle/>
+          <a:p>
+            <a:r>
+              <a:rPr lang="en-IN" dirty="0">
+                <a:solidFill>
+                  <a:schemeClr val="accent1">
+                    <a:lumMod val="50000"/>
+                  </a:schemeClr>
+                </a:solidFill>
+                <a:latin typeface="Times New Roman" panose="02020603050405020304" pitchFamily="18" charset="0"/>
+                <a:cs typeface="Times New Roman" panose="02020603050405020304" pitchFamily="18" charset="0"/>
+              </a:rPr>
+              <a:t>Ayush </a:t>
+            </a:r>
+            <a:r>
+              <a:rPr lang="en-IN" dirty="0" smtClean="0">
+                <a:solidFill>
+                  <a:schemeClr val="accent1">
+                    <a:lumMod val="50000"/>
+                  </a:schemeClr>
+                </a:solidFill>
+                <a:latin typeface="Times New Roman" panose="02020603050405020304" pitchFamily="18" charset="0"/>
+                <a:cs typeface="Times New Roman" panose="02020603050405020304" pitchFamily="18" charset="0"/>
+              </a:rPr>
+              <a:t>Gupta                                             PPT Design</a:t>
+            </a:r>
+          </a:p>
+          <a:p>
+            <a:r>
+              <a:rPr lang="en-IN" dirty="0" smtClean="0">
+                <a:solidFill>
+                  <a:schemeClr val="accent1">
+                    <a:lumMod val="50000"/>
+                  </a:schemeClr>
+                </a:solidFill>
+                <a:latin typeface="Times New Roman" panose="02020603050405020304" pitchFamily="18" charset="0"/>
+                <a:cs typeface="Times New Roman" panose="02020603050405020304" pitchFamily="18" charset="0"/>
+              </a:rPr>
+              <a:t>H </a:t>
+            </a:r>
+            <a:r>
+              <a:rPr lang="en-IN" dirty="0">
+                <a:solidFill>
+                  <a:schemeClr val="accent1">
+                    <a:lumMod val="50000"/>
+                  </a:schemeClr>
+                </a:solidFill>
+                <a:latin typeface="Times New Roman" panose="02020603050405020304" pitchFamily="18" charset="0"/>
+                <a:cs typeface="Times New Roman" panose="02020603050405020304" pitchFamily="18" charset="0"/>
+              </a:rPr>
+              <a:t>Sai </a:t>
+            </a:r>
+            <a:r>
+              <a:rPr lang="en-IN" dirty="0" err="1">
+                <a:solidFill>
+                  <a:schemeClr val="accent1">
+                    <a:lumMod val="50000"/>
+                  </a:schemeClr>
+                </a:solidFill>
+                <a:latin typeface="Times New Roman" panose="02020603050405020304" pitchFamily="18" charset="0"/>
+                <a:cs typeface="Times New Roman" panose="02020603050405020304" pitchFamily="18" charset="0"/>
+              </a:rPr>
+              <a:t>Karthik</a:t>
+            </a:r>
+            <a:r>
+              <a:rPr lang="en-IN" dirty="0">
+                <a:solidFill>
+                  <a:schemeClr val="accent1">
+                    <a:lumMod val="50000"/>
+                  </a:schemeClr>
+                </a:solidFill>
+                <a:latin typeface="Times New Roman" panose="02020603050405020304" pitchFamily="18" charset="0"/>
+                <a:cs typeface="Times New Roman" panose="02020603050405020304" pitchFamily="18" charset="0"/>
+              </a:rPr>
+              <a:t> </a:t>
+            </a:r>
+            <a:r>
+              <a:rPr lang="en-IN" dirty="0" err="1" smtClean="0">
+                <a:solidFill>
+                  <a:schemeClr val="accent1">
+                    <a:lumMod val="50000"/>
+                  </a:schemeClr>
+                </a:solidFill>
+                <a:latin typeface="Times New Roman" panose="02020603050405020304" pitchFamily="18" charset="0"/>
+                <a:cs typeface="Times New Roman" panose="02020603050405020304" pitchFamily="18" charset="0"/>
+              </a:rPr>
+              <a:t>Velavarthypathi</a:t>
+            </a:r>
+            <a:endParaRPr lang="en-IN" dirty="0" smtClean="0">
+              <a:solidFill>
+                <a:schemeClr val="accent1">
+                  <a:lumMod val="50000"/>
+                </a:schemeClr>
+              </a:solidFill>
+              <a:latin typeface="Times New Roman" panose="02020603050405020304" pitchFamily="18" charset="0"/>
+              <a:cs typeface="Times New Roman" panose="02020603050405020304" pitchFamily="18" charset="0"/>
+            </a:endParaRPr>
+          </a:p>
+          <a:p>
+            <a:r>
+              <a:rPr lang="en-IN" dirty="0" err="1">
+                <a:solidFill>
+                  <a:schemeClr val="accent1">
+                    <a:lumMod val="50000"/>
+                  </a:schemeClr>
+                </a:solidFill>
+                <a:latin typeface="Times New Roman" panose="02020603050405020304" pitchFamily="18" charset="0"/>
+                <a:cs typeface="Times New Roman" panose="02020603050405020304" pitchFamily="18" charset="0"/>
+              </a:rPr>
+              <a:t>Akash</a:t>
+            </a:r>
+            <a:r>
+              <a:rPr lang="en-IN" dirty="0">
+                <a:solidFill>
+                  <a:schemeClr val="accent1">
+                    <a:lumMod val="50000"/>
+                  </a:schemeClr>
+                </a:solidFill>
+                <a:latin typeface="Times New Roman" panose="02020603050405020304" pitchFamily="18" charset="0"/>
+                <a:cs typeface="Times New Roman" panose="02020603050405020304" pitchFamily="18" charset="0"/>
+              </a:rPr>
+              <a:t> </a:t>
+            </a:r>
+            <a:r>
+              <a:rPr lang="en-IN" dirty="0" smtClean="0">
+                <a:solidFill>
+                  <a:schemeClr val="accent1">
+                    <a:lumMod val="50000"/>
+                  </a:schemeClr>
+                </a:solidFill>
+                <a:latin typeface="Times New Roman" panose="02020603050405020304" pitchFamily="18" charset="0"/>
+                <a:cs typeface="Times New Roman" panose="02020603050405020304" pitchFamily="18" charset="0"/>
+              </a:rPr>
+              <a:t>PS                                                  Reference (Research Papers, GitHub)</a:t>
+            </a:r>
+            <a:endParaRPr lang="en-IN" dirty="0">
+              <a:solidFill>
+                <a:schemeClr val="accent1">
+                  <a:lumMod val="50000"/>
+                </a:schemeClr>
+              </a:solidFill>
+              <a:latin typeface="Times New Roman" panose="02020603050405020304" pitchFamily="18" charset="0"/>
+              <a:cs typeface="Times New Roman" panose="02020603050405020304" pitchFamily="18" charset="0"/>
+            </a:endParaRPr>
+          </a:p>
+          <a:p>
+            <a:r>
+              <a:rPr lang="en-IN" dirty="0">
+                <a:solidFill>
+                  <a:schemeClr val="accent1">
+                    <a:lumMod val="50000"/>
+                  </a:schemeClr>
+                </a:solidFill>
+                <a:latin typeface="Times New Roman" panose="02020603050405020304" pitchFamily="18" charset="0"/>
+                <a:cs typeface="Times New Roman" panose="02020603050405020304" pitchFamily="18" charset="0"/>
+              </a:rPr>
+              <a:t>K Sai </a:t>
+            </a:r>
+            <a:r>
+              <a:rPr lang="en-IN" dirty="0" err="1">
+                <a:solidFill>
+                  <a:schemeClr val="accent1">
+                    <a:lumMod val="50000"/>
+                  </a:schemeClr>
+                </a:solidFill>
+                <a:latin typeface="Times New Roman" panose="02020603050405020304" pitchFamily="18" charset="0"/>
+                <a:cs typeface="Times New Roman" panose="02020603050405020304" pitchFamily="18" charset="0"/>
+              </a:rPr>
+              <a:t>Darshan</a:t>
+            </a:r>
+            <a:r>
+              <a:rPr lang="en-IN" dirty="0">
+                <a:solidFill>
+                  <a:schemeClr val="accent1">
+                    <a:lumMod val="50000"/>
+                  </a:schemeClr>
+                </a:solidFill>
+                <a:latin typeface="Times New Roman" panose="02020603050405020304" pitchFamily="18" charset="0"/>
+                <a:cs typeface="Times New Roman" panose="02020603050405020304" pitchFamily="18" charset="0"/>
+              </a:rPr>
+              <a:t> </a:t>
+            </a:r>
+            <a:r>
+              <a:rPr lang="en-IN" dirty="0" smtClean="0">
+                <a:solidFill>
+                  <a:schemeClr val="accent1">
+                    <a:lumMod val="50000"/>
+                  </a:schemeClr>
+                </a:solidFill>
+                <a:latin typeface="Times New Roman" panose="02020603050405020304" pitchFamily="18" charset="0"/>
+                <a:cs typeface="Times New Roman" panose="02020603050405020304" pitchFamily="18" charset="0"/>
+              </a:rPr>
+              <a:t>Reddy</a:t>
+            </a:r>
+          </a:p>
+          <a:p>
+            <a:r>
+              <a:rPr lang="en-IN" dirty="0" err="1">
+                <a:solidFill>
+                  <a:schemeClr val="accent1">
+                    <a:lumMod val="50000"/>
+                  </a:schemeClr>
+                </a:solidFill>
+                <a:latin typeface="Times New Roman" panose="02020603050405020304" pitchFamily="18" charset="0"/>
+                <a:cs typeface="Times New Roman" panose="02020603050405020304" pitchFamily="18" charset="0"/>
+              </a:rPr>
+              <a:t>Vivek</a:t>
+            </a:r>
+            <a:r>
+              <a:rPr lang="en-IN" dirty="0">
+                <a:solidFill>
+                  <a:schemeClr val="accent1">
+                    <a:lumMod val="50000"/>
+                  </a:schemeClr>
+                </a:solidFill>
+                <a:latin typeface="Times New Roman" panose="02020603050405020304" pitchFamily="18" charset="0"/>
+                <a:cs typeface="Times New Roman" panose="02020603050405020304" pitchFamily="18" charset="0"/>
+              </a:rPr>
+              <a:t> Reddy						   </a:t>
+            </a:r>
+            <a:r>
+              <a:rPr lang="en-IN" dirty="0" smtClean="0">
+                <a:solidFill>
+                  <a:schemeClr val="accent1">
+                    <a:lumMod val="50000"/>
+                  </a:schemeClr>
+                </a:solidFill>
+                <a:latin typeface="Times New Roman" panose="02020603050405020304" pitchFamily="18" charset="0"/>
+                <a:cs typeface="Times New Roman" panose="02020603050405020304" pitchFamily="18" charset="0"/>
+              </a:rPr>
+              <a:t>          YouTube Reference</a:t>
+            </a:r>
+          </a:p>
+          <a:p>
+            <a:r>
+              <a:rPr lang="en-IN" dirty="0" err="1" smtClean="0">
+                <a:solidFill>
+                  <a:schemeClr val="accent1">
+                    <a:lumMod val="50000"/>
+                  </a:schemeClr>
+                </a:solidFill>
+                <a:latin typeface="Times New Roman" panose="02020603050405020304" pitchFamily="18" charset="0"/>
+                <a:cs typeface="Times New Roman" panose="02020603050405020304" pitchFamily="18" charset="0"/>
+              </a:rPr>
+              <a:t>Suhas</a:t>
+            </a:r>
+            <a:r>
+              <a:rPr lang="en-IN" dirty="0" smtClean="0">
+                <a:solidFill>
+                  <a:schemeClr val="accent1">
+                    <a:lumMod val="50000"/>
+                  </a:schemeClr>
+                </a:solidFill>
+                <a:latin typeface="Times New Roman" panose="02020603050405020304" pitchFamily="18" charset="0"/>
+                <a:cs typeface="Times New Roman" panose="02020603050405020304" pitchFamily="18" charset="0"/>
+              </a:rPr>
+              <a:t> A</a:t>
+            </a:r>
+          </a:p>
+          <a:p>
+            <a:endParaRPr lang="en-IN" dirty="0" smtClean="0">
+              <a:solidFill>
+                <a:schemeClr val="accent1">
+                  <a:lumMod val="50000"/>
+                </a:schemeClr>
+              </a:solidFill>
+              <a:latin typeface="Times New Roman" panose="02020603050405020304" pitchFamily="18" charset="0"/>
+              <a:cs typeface="Times New Roman" panose="02020603050405020304" pitchFamily="18" charset="0"/>
+            </a:endParaRPr>
+          </a:p>
+          <a:p>
+            <a:pPr marL="0" indent="0">
+              <a:buNone/>
+            </a:pPr>
+            <a:endParaRPr lang="en-IN" dirty="0">
+              <a:solidFill>
+                <a:schemeClr val="accent1">
+                  <a:lumMod val="50000"/>
+                </a:schemeClr>
+              </a:solidFill>
+              <a:latin typeface="Times New Roman" panose="02020603050405020304" pitchFamily="18" charset="0"/>
+              <a:cs typeface="Times New Roman" panose="02020603050405020304" pitchFamily="18" charset="0"/>
+            </a:endParaRPr>
+          </a:p>
+        </p:txBody>
+      </p:sp>
+      <p:sp>
+        <p:nvSpPr>
+          <p:cNvPr id="131" name="Slide Number"/>
+          <p:cNvSpPr txBox="1">
+            <a:spLocks noGrp="1"/>
+          </p:cNvSpPr>
+          <p:nvPr>
+            <p:ph type="sldNum" sz="quarter" idx="2"/>
+          </p:nvPr>
+        </p:nvSpPr>
+        <p:spPr>
+          <a:xfrm>
+            <a:off x="8754976" y="4700819"/>
+            <a:ext cx="266183" cy="318396"/>
+          </a:xfrm>
+          <a:prstGeom prst="rect">
+            <a:avLst/>
+          </a:prstGeom>
+          <a:extLst>
+            <a:ext uri="{C572A759-6A51-4108-AA02-DFA0A04FC94B}">
+              <ma14:wrappingTextBoxFlag xmlns:ma14="http://schemas.microsoft.com/office/mac/drawingml/2011/main" xmlns:a14="http://schemas.microsoft.com/office/drawing/2010/main" xmlns:m="http://schemas.openxmlformats.org/officeDocument/2006/math" xmlns="" val="1"/>
+            </a:ext>
+          </a:extLst>
+        </p:spPr>
+        <p:txBody>
+          <a:bodyPr/>
+          <a:lstStyle/>
+          <a:p>
+            <a:fld id="{86CB4B4D-7CA3-9044-876B-883B54F8677D}" type="slidenum">
+              <a:t>11</a:t>
+            </a:fld>
+            <a:endParaRPr dirty="0"/>
+          </a:p>
+        </p:txBody>
+      </p:sp>
+    </p:spTree>
+    <p:extLst>
+      <p:ext uri="{BB962C8B-B14F-4D97-AF65-F5344CB8AC3E}">
+        <p14:creationId xmlns:p14="http://schemas.microsoft.com/office/powerpoint/2010/main" val="2992896965"/>
+      </p:ext>
+    </p:extLst>
+  </p:cSld>
+  <p:clrMapOvr>
+    <a:masterClrMapping/>
+  </p:clrMapOvr>
+  <p:transition spd="med"/>
+  <p:timing>
+    <p:tnLst>
+      <p:par>
+        <p:cTn id="1" dur="indefinite" restart="never" nodeType="tmRoot"/>
+      </p:par>
+    </p:tnLst>
+  </p:timing>
 </p:sld>
 </file>
 
@@ -7025,6 +7488,13 @@
     <a:masterClrMapping/>
   </p:clrMapOvr>
   <p:transition spd="med"/>
+  <p:timing>
+    <p:tnLst>
+      <p:par>
+        <p:cTn id="1" dur="indefinite" restart="never" nodeType="tmRoot"/>
+      </p:par>
+    </p:tnLst>
+  </p:timing>
 </p:sld>
 </file>
 
@@ -7417,6 +7887,13 @@
     <a:masterClrMapping/>
   </p:clrMapOvr>
   <p:transition spd="med"/>
+  <p:timing>
+    <p:tnLst>
+      <p:par>
+        <p:cTn id="1" dur="indefinite" restart="never" nodeType="tmRoot"/>
+      </p:par>
+    </p:tnLst>
+  </p:timing>
 </p:sld>
 </file>
 
@@ -7562,6 +8039,13 @@
     <a:masterClrMapping/>
   </p:clrMapOvr>
   <p:transition spd="med"/>
+  <p:timing>
+    <p:tnLst>
+      <p:par>
+        <p:cTn id="1" dur="indefinite" restart="never" nodeType="tmRoot"/>
+      </p:par>
+    </p:tnLst>
+  </p:timing>
 </p:sld>
 </file>
 
@@ -7825,6 +8309,13 @@
     <a:masterClrMapping/>
   </p:clrMapOvr>
   <p:transition spd="med"/>
+  <p:timing>
+    <p:tnLst>
+      <p:par>
+        <p:cTn id="1" dur="indefinite" restart="never" nodeType="tmRoot"/>
+      </p:par>
+    </p:tnLst>
+  </p:timing>
 </p:sld>
 </file>
 
@@ -8049,6 +8540,13 @@
     <a:masterClrMapping/>
   </p:clrMapOvr>
   <p:transition spd="med"/>
+  <p:timing>
+    <p:tnLst>
+      <p:par>
+        <p:cTn id="1" dur="indefinite" restart="never" nodeType="tmRoot"/>
+      </p:par>
+    </p:tnLst>
+  </p:timing>
 </p:sld>
 </file>
 
@@ -8255,6 +8753,13 @@
     <a:masterClrMapping/>
   </p:clrMapOvr>
   <p:transition spd="med"/>
+  <p:timing>
+    <p:tnLst>
+      <p:par>
+        <p:cTn id="1" dur="indefinite" restart="never" nodeType="tmRoot"/>
+      </p:par>
+    </p:tnLst>
+  </p:timing>
 </p:sld>
 </file>
 
@@ -9426,6 +9931,13 @@
     <a:masterClrMapping/>
   </p:clrMapOvr>
   <p:transition spd="med"/>
+  <p:timing>
+    <p:tnLst>
+      <p:par>
+        <p:cTn id="1" dur="indefinite" restart="never" nodeType="tmRoot"/>
+      </p:par>
+    </p:tnLst>
+  </p:timing>
 </p:sld>
 </file>
 
@@ -10334,6 +10846,13 @@
     <a:masterClrMapping/>
   </p:clrMapOvr>
   <p:transition spd="med"/>
+  <p:timing>
+    <p:tnLst>
+      <p:par>
+        <p:cTn id="1" dur="indefinite" restart="never" nodeType="tmRoot"/>
+      </p:par>
+    </p:tnLst>
+  </p:timing>
 </p:sld>
 </file>
 

</xml_diff>